<commit_message>
add new picutre for the selection of steamvr plugin
</commit_message>
<xml_diff>
--- a/03_Figures/04_Valve/OpenVR_SteamVR.pptx
+++ b/03_Figures/04_Valve/OpenVR_SteamVR.pptx
@@ -6,6 +6,7 @@
   </p:sldMasterIdLst>
   <p:sldIdLst>
     <p:sldId id="256" r:id="rId2"/>
+    <p:sldId id="257" r:id="rId3"/>
   </p:sldIdLst>
   <p:sldSz cx="12192000" cy="6858000"/>
   <p:notesSz cx="6858000" cy="9144000"/>
@@ -243,7 +244,7 @@
           <a:p>
             <a:fld id="{BA754E3D-2AC7-774B-93C2-CDAF1A518BB0}" type="datetimeFigureOut">
               <a:rPr lang="en-GB" smtClean="0"/>
-              <a:t>10/07/2016</a:t>
+              <a:t>21/01/2017</a:t>
             </a:fld>
             <a:endParaRPr lang="en-GB"/>
           </a:p>
@@ -413,7 +414,7 @@
           <a:p>
             <a:fld id="{BA754E3D-2AC7-774B-93C2-CDAF1A518BB0}" type="datetimeFigureOut">
               <a:rPr lang="en-GB" smtClean="0"/>
-              <a:t>10/07/2016</a:t>
+              <a:t>21/01/2017</a:t>
             </a:fld>
             <a:endParaRPr lang="en-GB"/>
           </a:p>
@@ -593,7 +594,7 @@
           <a:p>
             <a:fld id="{BA754E3D-2AC7-774B-93C2-CDAF1A518BB0}" type="datetimeFigureOut">
               <a:rPr lang="en-GB" smtClean="0"/>
-              <a:t>10/07/2016</a:t>
+              <a:t>21/01/2017</a:t>
             </a:fld>
             <a:endParaRPr lang="en-GB"/>
           </a:p>
@@ -763,7 +764,7 @@
           <a:p>
             <a:fld id="{BA754E3D-2AC7-774B-93C2-CDAF1A518BB0}" type="datetimeFigureOut">
               <a:rPr lang="en-GB" smtClean="0"/>
-              <a:t>10/07/2016</a:t>
+              <a:t>21/01/2017</a:t>
             </a:fld>
             <a:endParaRPr lang="en-GB"/>
           </a:p>
@@ -1009,7 +1010,7 @@
           <a:p>
             <a:fld id="{BA754E3D-2AC7-774B-93C2-CDAF1A518BB0}" type="datetimeFigureOut">
               <a:rPr lang="en-GB" smtClean="0"/>
-              <a:t>10/07/2016</a:t>
+              <a:t>21/01/2017</a:t>
             </a:fld>
             <a:endParaRPr lang="en-GB"/>
           </a:p>
@@ -1241,7 +1242,7 @@
           <a:p>
             <a:fld id="{BA754E3D-2AC7-774B-93C2-CDAF1A518BB0}" type="datetimeFigureOut">
               <a:rPr lang="en-GB" smtClean="0"/>
-              <a:t>10/07/2016</a:t>
+              <a:t>21/01/2017</a:t>
             </a:fld>
             <a:endParaRPr lang="en-GB"/>
           </a:p>
@@ -1608,7 +1609,7 @@
           <a:p>
             <a:fld id="{BA754E3D-2AC7-774B-93C2-CDAF1A518BB0}" type="datetimeFigureOut">
               <a:rPr lang="en-GB" smtClean="0"/>
-              <a:t>10/07/2016</a:t>
+              <a:t>21/01/2017</a:t>
             </a:fld>
             <a:endParaRPr lang="en-GB"/>
           </a:p>
@@ -1726,7 +1727,7 @@
           <a:p>
             <a:fld id="{BA754E3D-2AC7-774B-93C2-CDAF1A518BB0}" type="datetimeFigureOut">
               <a:rPr lang="en-GB" smtClean="0"/>
-              <a:t>10/07/2016</a:t>
+              <a:t>21/01/2017</a:t>
             </a:fld>
             <a:endParaRPr lang="en-GB"/>
           </a:p>
@@ -1821,7 +1822,7 @@
           <a:p>
             <a:fld id="{BA754E3D-2AC7-774B-93C2-CDAF1A518BB0}" type="datetimeFigureOut">
               <a:rPr lang="en-GB" smtClean="0"/>
-              <a:t>10/07/2016</a:t>
+              <a:t>21/01/2017</a:t>
             </a:fld>
             <a:endParaRPr lang="en-GB"/>
           </a:p>
@@ -2098,7 +2099,7 @@
           <a:p>
             <a:fld id="{BA754E3D-2AC7-774B-93C2-CDAF1A518BB0}" type="datetimeFigureOut">
               <a:rPr lang="en-GB" smtClean="0"/>
-              <a:t>10/07/2016</a:t>
+              <a:t>21/01/2017</a:t>
             </a:fld>
             <a:endParaRPr lang="en-GB"/>
           </a:p>
@@ -2351,7 +2352,7 @@
           <a:p>
             <a:fld id="{BA754E3D-2AC7-774B-93C2-CDAF1A518BB0}" type="datetimeFigureOut">
               <a:rPr lang="en-GB" smtClean="0"/>
-              <a:t>10/07/2016</a:t>
+              <a:t>21/01/2017</a:t>
             </a:fld>
             <a:endParaRPr lang="en-GB"/>
           </a:p>
@@ -2564,7 +2565,7 @@
           <a:p>
             <a:fld id="{BA754E3D-2AC7-774B-93C2-CDAF1A518BB0}" type="datetimeFigureOut">
               <a:rPr lang="en-GB" smtClean="0"/>
-              <a:t>10/07/2016</a:t>
+              <a:t>21/01/2017</a:t>
             </a:fld>
             <a:endParaRPr lang="en-GB"/>
           </a:p>
@@ -3069,12 +3070,8 @@
           <a:p>
             <a:pPr algn="ctr"/>
             <a:r>
-              <a:rPr lang="en-GB" sz="2800" dirty="0" err="1" smtClean="0"/>
-              <a:t>SteamVR</a:t>
-            </a:r>
-            <a:r>
               <a:rPr lang="en-GB" sz="2800" dirty="0" smtClean="0"/>
-              <a:t> Plugin</a:t>
+              <a:t>SteamVR Plugin</a:t>
             </a:r>
             <a:endParaRPr lang="en-GB" sz="2800" dirty="0"/>
           </a:p>
@@ -3195,7 +3192,7 @@
           <a:p>
             <a:pPr algn="ctr"/>
             <a:r>
-              <a:rPr lang="en-GB" sz="2800" smtClean="0"/>
+              <a:rPr lang="en-GB" sz="2800" dirty="0" smtClean="0"/>
               <a:t>SteamVR</a:t>
             </a:r>
             <a:endParaRPr lang="en-GB" sz="2800" dirty="0"/>
@@ -4133,6 +4130,1305 @@
     <p:extLst>
       <p:ext uri="{BB962C8B-B14F-4D97-AF65-F5344CB8AC3E}">
         <p14:creationId xmlns:p14="http://schemas.microsoft.com/office/powerpoint/2010/main" val="1518906460"/>
+      </p:ext>
+    </p:extLst>
+  </p:cSld>
+  <p:clrMapOvr>
+    <a:masterClrMapping/>
+  </p:clrMapOvr>
+  <p:timing>
+    <p:tnLst>
+      <p:par>
+        <p:cTn id="1" dur="indefinite" restart="never" nodeType="tmRoot"/>
+      </p:par>
+    </p:tnLst>
+  </p:timing>
+</p:sld>
+</file>
+
+<file path=ppt/slides/slide2.xml><?xml version="1.0" encoding="utf-8"?>
+<p:sld xmlns:a="http://schemas.openxmlformats.org/drawingml/2006/main" xmlns:r="http://schemas.openxmlformats.org/officeDocument/2006/relationships" xmlns:p="http://schemas.openxmlformats.org/presentationml/2006/main">
+  <p:cSld>
+    <p:spTree>
+      <p:nvGrpSpPr>
+        <p:cNvPr id="1" name=""/>
+        <p:cNvGrpSpPr/>
+        <p:nvPr/>
+      </p:nvGrpSpPr>
+      <p:grpSpPr>
+        <a:xfrm>
+          <a:off x="0" y="0"/>
+          <a:ext cx="0" cy="0"/>
+          <a:chOff x="0" y="0"/>
+          <a:chExt cx="0" cy="0"/>
+        </a:xfrm>
+      </p:grpSpPr>
+      <p:sp>
+        <p:nvSpPr>
+          <p:cNvPr id="4" name="Rectangle 3"/>
+          <p:cNvSpPr/>
+          <p:nvPr/>
+        </p:nvSpPr>
+        <p:spPr>
+          <a:xfrm>
+            <a:off x="1143000" y="901700"/>
+            <a:ext cx="1905000" cy="5168900"/>
+          </a:xfrm>
+          <a:prstGeom prst="rect">
+            <a:avLst/>
+          </a:prstGeom>
+          <a:solidFill>
+            <a:schemeClr val="accent2">
+              <a:lumMod val="60000"/>
+              <a:lumOff val="40000"/>
+            </a:schemeClr>
+          </a:solidFill>
+        </p:spPr>
+        <p:style>
+          <a:lnRef idx="2">
+            <a:schemeClr val="accent2">
+              <a:shade val="50000"/>
+            </a:schemeClr>
+          </a:lnRef>
+          <a:fillRef idx="1">
+            <a:schemeClr val="accent2"/>
+          </a:fillRef>
+          <a:effectRef idx="0">
+            <a:schemeClr val="accent2"/>
+          </a:effectRef>
+          <a:fontRef idx="minor">
+            <a:schemeClr val="lt1"/>
+          </a:fontRef>
+        </p:style>
+        <p:txBody>
+          <a:bodyPr rtlCol="0" anchor="ctr"/>
+          <a:lstStyle/>
+          <a:p>
+            <a:pPr algn="ctr"/>
+            <a:r>
+              <a:rPr lang="en-GB" sz="2800" dirty="0" smtClean="0"/>
+              <a:t>Your Software</a:t>
+            </a:r>
+            <a:endParaRPr lang="en-GB" sz="2800" dirty="0"/>
+          </a:p>
+        </p:txBody>
+      </p:sp>
+      <p:sp>
+        <p:nvSpPr>
+          <p:cNvPr id="5" name="Rectangle 4"/>
+          <p:cNvSpPr/>
+          <p:nvPr/>
+        </p:nvSpPr>
+        <p:spPr>
+          <a:xfrm>
+            <a:off x="3632200" y="901700"/>
+            <a:ext cx="1905000" cy="1066800"/>
+          </a:xfrm>
+          <a:prstGeom prst="rect">
+            <a:avLst/>
+          </a:prstGeom>
+          <a:solidFill>
+            <a:schemeClr val="accent6">
+              <a:lumMod val="60000"/>
+              <a:lumOff val="40000"/>
+            </a:schemeClr>
+          </a:solidFill>
+          <a:ln>
+            <a:solidFill>
+              <a:schemeClr val="accent6">
+                <a:lumMod val="75000"/>
+              </a:schemeClr>
+            </a:solidFill>
+          </a:ln>
+        </p:spPr>
+        <p:style>
+          <a:lnRef idx="2">
+            <a:schemeClr val="accent2">
+              <a:shade val="50000"/>
+            </a:schemeClr>
+          </a:lnRef>
+          <a:fillRef idx="1">
+            <a:schemeClr val="accent2"/>
+          </a:fillRef>
+          <a:effectRef idx="0">
+            <a:schemeClr val="accent2"/>
+          </a:effectRef>
+          <a:fontRef idx="minor">
+            <a:schemeClr val="lt1"/>
+          </a:fontRef>
+        </p:style>
+        <p:txBody>
+          <a:bodyPr rtlCol="0" anchor="ctr"/>
+          <a:lstStyle/>
+          <a:p>
+            <a:pPr algn="ctr"/>
+            <a:r>
+              <a:rPr lang="en-GB" sz="2800" dirty="0" smtClean="0"/>
+              <a:t>SteamVR Plugin</a:t>
+            </a:r>
+            <a:endParaRPr lang="en-GB" sz="2800" dirty="0"/>
+          </a:p>
+        </p:txBody>
+      </p:sp>
+      <p:sp>
+        <p:nvSpPr>
+          <p:cNvPr id="7" name="Rectangle 6"/>
+          <p:cNvSpPr/>
+          <p:nvPr/>
+        </p:nvSpPr>
+        <p:spPr>
+          <a:xfrm>
+            <a:off x="3632200" y="2235200"/>
+            <a:ext cx="1905000" cy="3835400"/>
+          </a:xfrm>
+          <a:prstGeom prst="rect">
+            <a:avLst/>
+          </a:prstGeom>
+          <a:solidFill>
+            <a:schemeClr val="accent1">
+              <a:lumMod val="40000"/>
+              <a:lumOff val="60000"/>
+            </a:schemeClr>
+          </a:solidFill>
+          <a:ln>
+            <a:solidFill>
+              <a:schemeClr val="accent1">
+                <a:lumMod val="75000"/>
+              </a:schemeClr>
+            </a:solidFill>
+          </a:ln>
+        </p:spPr>
+        <p:style>
+          <a:lnRef idx="2">
+            <a:schemeClr val="accent2">
+              <a:shade val="50000"/>
+            </a:schemeClr>
+          </a:lnRef>
+          <a:fillRef idx="1">
+            <a:schemeClr val="accent2"/>
+          </a:fillRef>
+          <a:effectRef idx="0">
+            <a:schemeClr val="accent2"/>
+          </a:effectRef>
+          <a:fontRef idx="minor">
+            <a:schemeClr val="lt1"/>
+          </a:fontRef>
+        </p:style>
+        <p:txBody>
+          <a:bodyPr rtlCol="0" anchor="ctr"/>
+          <a:lstStyle/>
+          <a:p>
+            <a:pPr algn="ctr"/>
+            <a:r>
+              <a:rPr lang="en-GB" sz="2800" dirty="0" smtClean="0">
+                <a:solidFill>
+                  <a:sysClr val="windowText" lastClr="000000"/>
+                </a:solidFill>
+              </a:rPr>
+              <a:t>Unity VR API</a:t>
+            </a:r>
+            <a:endParaRPr lang="en-GB" sz="2800" dirty="0">
+              <a:solidFill>
+                <a:sysClr val="windowText" lastClr="000000"/>
+              </a:solidFill>
+            </a:endParaRPr>
+          </a:p>
+        </p:txBody>
+      </p:sp>
+      <p:sp>
+        <p:nvSpPr>
+          <p:cNvPr id="8" name="Rectangle 7"/>
+          <p:cNvSpPr/>
+          <p:nvPr/>
+        </p:nvSpPr>
+        <p:spPr>
+          <a:xfrm>
+            <a:off x="6121400" y="901700"/>
+            <a:ext cx="1905000" cy="2946400"/>
+          </a:xfrm>
+          <a:prstGeom prst="rect">
+            <a:avLst/>
+          </a:prstGeom>
+          <a:solidFill>
+            <a:schemeClr val="accent6">
+              <a:lumMod val="60000"/>
+              <a:lumOff val="40000"/>
+            </a:schemeClr>
+          </a:solidFill>
+          <a:ln>
+            <a:solidFill>
+              <a:schemeClr val="accent6">
+                <a:lumMod val="75000"/>
+              </a:schemeClr>
+            </a:solidFill>
+          </a:ln>
+        </p:spPr>
+        <p:style>
+          <a:lnRef idx="2">
+            <a:schemeClr val="accent2">
+              <a:shade val="50000"/>
+            </a:schemeClr>
+          </a:lnRef>
+          <a:fillRef idx="1">
+            <a:schemeClr val="accent2"/>
+          </a:fillRef>
+          <a:effectRef idx="0">
+            <a:schemeClr val="accent2"/>
+          </a:effectRef>
+          <a:fontRef idx="minor">
+            <a:schemeClr val="lt1"/>
+          </a:fontRef>
+        </p:style>
+        <p:txBody>
+          <a:bodyPr rtlCol="0" anchor="ctr"/>
+          <a:lstStyle/>
+          <a:p>
+            <a:pPr algn="ctr"/>
+            <a:r>
+              <a:rPr lang="en-GB" sz="2800" dirty="0" smtClean="0"/>
+              <a:t>SteamVR</a:t>
+            </a:r>
+            <a:endParaRPr lang="en-GB" sz="2800" dirty="0"/>
+          </a:p>
+        </p:txBody>
+      </p:sp>
+      <p:sp>
+        <p:nvSpPr>
+          <p:cNvPr id="9" name="Rectangle 8"/>
+          <p:cNvSpPr/>
+          <p:nvPr/>
+        </p:nvSpPr>
+        <p:spPr>
+          <a:xfrm>
+            <a:off x="6121400" y="4191000"/>
+            <a:ext cx="1905000" cy="869950"/>
+          </a:xfrm>
+          <a:prstGeom prst="rect">
+            <a:avLst/>
+          </a:prstGeom>
+          <a:solidFill>
+            <a:schemeClr val="bg1">
+              <a:lumMod val="85000"/>
+            </a:schemeClr>
+          </a:solidFill>
+          <a:ln>
+            <a:solidFill>
+              <a:schemeClr val="accent5">
+                <a:lumMod val="50000"/>
+              </a:schemeClr>
+            </a:solidFill>
+          </a:ln>
+        </p:spPr>
+        <p:style>
+          <a:lnRef idx="2">
+            <a:schemeClr val="accent2">
+              <a:shade val="50000"/>
+            </a:schemeClr>
+          </a:lnRef>
+          <a:fillRef idx="1">
+            <a:schemeClr val="accent2"/>
+          </a:fillRef>
+          <a:effectRef idx="0">
+            <a:schemeClr val="accent2"/>
+          </a:effectRef>
+          <a:fontRef idx="minor">
+            <a:schemeClr val="lt1"/>
+          </a:fontRef>
+        </p:style>
+        <p:txBody>
+          <a:bodyPr rtlCol="0" anchor="ctr"/>
+          <a:lstStyle/>
+          <a:p>
+            <a:pPr algn="ctr"/>
+            <a:r>
+              <a:rPr lang="en-GB" sz="2800" dirty="0" smtClean="0">
+                <a:solidFill>
+                  <a:schemeClr val="tx1">
+                    <a:lumMod val="50000"/>
+                    <a:lumOff val="50000"/>
+                  </a:schemeClr>
+                </a:solidFill>
+              </a:rPr>
+              <a:t>Oculus SDK</a:t>
+            </a:r>
+            <a:endParaRPr lang="en-GB" sz="2800" dirty="0">
+              <a:solidFill>
+                <a:schemeClr val="tx1">
+                  <a:lumMod val="50000"/>
+                  <a:lumOff val="50000"/>
+                </a:schemeClr>
+              </a:solidFill>
+            </a:endParaRPr>
+          </a:p>
+        </p:txBody>
+      </p:sp>
+      <p:sp>
+        <p:nvSpPr>
+          <p:cNvPr id="10" name="Rectangle 9"/>
+          <p:cNvSpPr/>
+          <p:nvPr/>
+        </p:nvSpPr>
+        <p:spPr>
+          <a:xfrm>
+            <a:off x="6121400" y="5200650"/>
+            <a:ext cx="1905000" cy="869950"/>
+          </a:xfrm>
+          <a:prstGeom prst="rect">
+            <a:avLst/>
+          </a:prstGeom>
+          <a:solidFill>
+            <a:schemeClr val="bg1">
+              <a:lumMod val="85000"/>
+            </a:schemeClr>
+          </a:solidFill>
+          <a:ln>
+            <a:solidFill>
+              <a:schemeClr val="accent5">
+                <a:lumMod val="50000"/>
+              </a:schemeClr>
+            </a:solidFill>
+          </a:ln>
+        </p:spPr>
+        <p:style>
+          <a:lnRef idx="2">
+            <a:schemeClr val="accent2">
+              <a:shade val="50000"/>
+            </a:schemeClr>
+          </a:lnRef>
+          <a:fillRef idx="1">
+            <a:schemeClr val="accent2"/>
+          </a:fillRef>
+          <a:effectRef idx="0">
+            <a:schemeClr val="accent2"/>
+          </a:effectRef>
+          <a:fontRef idx="minor">
+            <a:schemeClr val="lt1"/>
+          </a:fontRef>
+        </p:style>
+        <p:txBody>
+          <a:bodyPr rtlCol="0" anchor="ctr"/>
+          <a:lstStyle/>
+          <a:p>
+            <a:pPr algn="ctr"/>
+            <a:r>
+              <a:rPr lang="en-GB" sz="2800" dirty="0" smtClean="0">
+                <a:solidFill>
+                  <a:schemeClr val="tx1">
+                    <a:lumMod val="50000"/>
+                    <a:lumOff val="50000"/>
+                  </a:schemeClr>
+                </a:solidFill>
+              </a:rPr>
+              <a:t>Other SDK</a:t>
+            </a:r>
+            <a:endParaRPr lang="en-GB" sz="2800" dirty="0">
+              <a:solidFill>
+                <a:schemeClr val="tx1">
+                  <a:lumMod val="50000"/>
+                  <a:lumOff val="50000"/>
+                </a:schemeClr>
+              </a:solidFill>
+            </a:endParaRPr>
+          </a:p>
+        </p:txBody>
+      </p:sp>
+      <p:sp>
+        <p:nvSpPr>
+          <p:cNvPr id="11" name="Rectangle 10"/>
+          <p:cNvSpPr/>
+          <p:nvPr/>
+        </p:nvSpPr>
+        <p:spPr>
+          <a:xfrm>
+            <a:off x="8610600" y="5200650"/>
+            <a:ext cx="1905000" cy="869950"/>
+          </a:xfrm>
+          <a:prstGeom prst="rect">
+            <a:avLst/>
+          </a:prstGeom>
+          <a:solidFill>
+            <a:schemeClr val="bg1">
+              <a:lumMod val="85000"/>
+            </a:schemeClr>
+          </a:solidFill>
+          <a:ln>
+            <a:solidFill>
+              <a:schemeClr val="accent5">
+                <a:lumMod val="50000"/>
+              </a:schemeClr>
+            </a:solidFill>
+          </a:ln>
+        </p:spPr>
+        <p:style>
+          <a:lnRef idx="2">
+            <a:schemeClr val="accent2">
+              <a:shade val="50000"/>
+            </a:schemeClr>
+          </a:lnRef>
+          <a:fillRef idx="1">
+            <a:schemeClr val="accent2"/>
+          </a:fillRef>
+          <a:effectRef idx="0">
+            <a:schemeClr val="accent2"/>
+          </a:effectRef>
+          <a:fontRef idx="minor">
+            <a:schemeClr val="lt1"/>
+          </a:fontRef>
+        </p:style>
+        <p:txBody>
+          <a:bodyPr rtlCol="0" anchor="ctr"/>
+          <a:lstStyle/>
+          <a:p>
+            <a:pPr algn="ctr"/>
+            <a:r>
+              <a:rPr lang="en-GB" sz="2800" dirty="0" smtClean="0">
+                <a:solidFill>
+                  <a:schemeClr val="tx1">
+                    <a:lumMod val="50000"/>
+                    <a:lumOff val="50000"/>
+                  </a:schemeClr>
+                </a:solidFill>
+              </a:rPr>
+              <a:t>Other Hardware</a:t>
+            </a:r>
+            <a:endParaRPr lang="en-GB" sz="2800" dirty="0">
+              <a:solidFill>
+                <a:schemeClr val="tx1">
+                  <a:lumMod val="50000"/>
+                  <a:lumOff val="50000"/>
+                </a:schemeClr>
+              </a:solidFill>
+            </a:endParaRPr>
+          </a:p>
+        </p:txBody>
+      </p:sp>
+      <p:sp>
+        <p:nvSpPr>
+          <p:cNvPr id="12" name="Rectangle 11"/>
+          <p:cNvSpPr/>
+          <p:nvPr/>
+        </p:nvSpPr>
+        <p:spPr>
+          <a:xfrm>
+            <a:off x="8610600" y="4191000"/>
+            <a:ext cx="1905000" cy="869950"/>
+          </a:xfrm>
+          <a:prstGeom prst="rect">
+            <a:avLst/>
+          </a:prstGeom>
+          <a:solidFill>
+            <a:schemeClr val="bg1">
+              <a:lumMod val="85000"/>
+            </a:schemeClr>
+          </a:solidFill>
+          <a:ln>
+            <a:solidFill>
+              <a:schemeClr val="accent5">
+                <a:lumMod val="50000"/>
+              </a:schemeClr>
+            </a:solidFill>
+          </a:ln>
+        </p:spPr>
+        <p:style>
+          <a:lnRef idx="2">
+            <a:schemeClr val="accent2">
+              <a:shade val="50000"/>
+            </a:schemeClr>
+          </a:lnRef>
+          <a:fillRef idx="1">
+            <a:schemeClr val="accent2"/>
+          </a:fillRef>
+          <a:effectRef idx="0">
+            <a:schemeClr val="accent2"/>
+          </a:effectRef>
+          <a:fontRef idx="minor">
+            <a:schemeClr val="lt1"/>
+          </a:fontRef>
+        </p:style>
+        <p:txBody>
+          <a:bodyPr rtlCol="0" anchor="ctr"/>
+          <a:lstStyle/>
+          <a:p>
+            <a:pPr algn="ctr"/>
+            <a:r>
+              <a:rPr lang="en-GB" sz="2800" dirty="0" smtClean="0">
+                <a:solidFill>
+                  <a:schemeClr val="tx1">
+                    <a:lumMod val="50000"/>
+                    <a:lumOff val="50000"/>
+                  </a:schemeClr>
+                </a:solidFill>
+              </a:rPr>
+              <a:t>Oculus Rift</a:t>
+            </a:r>
+            <a:endParaRPr lang="en-GB" sz="2800" dirty="0">
+              <a:solidFill>
+                <a:schemeClr val="tx1">
+                  <a:lumMod val="50000"/>
+                  <a:lumOff val="50000"/>
+                </a:schemeClr>
+              </a:solidFill>
+            </a:endParaRPr>
+          </a:p>
+        </p:txBody>
+      </p:sp>
+      <p:sp>
+        <p:nvSpPr>
+          <p:cNvPr id="14" name="Rectangle 13"/>
+          <p:cNvSpPr/>
+          <p:nvPr/>
+        </p:nvSpPr>
+        <p:spPr>
+          <a:xfrm>
+            <a:off x="8610600" y="901700"/>
+            <a:ext cx="1905000" cy="869950"/>
+          </a:xfrm>
+          <a:prstGeom prst="rect">
+            <a:avLst/>
+          </a:prstGeom>
+          <a:solidFill>
+            <a:schemeClr val="accent6">
+              <a:lumMod val="20000"/>
+              <a:lumOff val="80000"/>
+            </a:schemeClr>
+          </a:solidFill>
+          <a:ln>
+            <a:solidFill>
+              <a:schemeClr val="accent6">
+                <a:lumMod val="75000"/>
+              </a:schemeClr>
+            </a:solidFill>
+          </a:ln>
+        </p:spPr>
+        <p:style>
+          <a:lnRef idx="2">
+            <a:schemeClr val="accent2">
+              <a:shade val="50000"/>
+            </a:schemeClr>
+          </a:lnRef>
+          <a:fillRef idx="1">
+            <a:schemeClr val="accent2"/>
+          </a:fillRef>
+          <a:effectRef idx="0">
+            <a:schemeClr val="accent2"/>
+          </a:effectRef>
+          <a:fontRef idx="minor">
+            <a:schemeClr val="lt1"/>
+          </a:fontRef>
+        </p:style>
+        <p:txBody>
+          <a:bodyPr rtlCol="0" anchor="ctr"/>
+          <a:lstStyle/>
+          <a:p>
+            <a:pPr algn="ctr"/>
+            <a:r>
+              <a:rPr lang="en-GB" sz="2800" dirty="0" smtClean="0">
+                <a:solidFill>
+                  <a:schemeClr val="accent6">
+                    <a:lumMod val="50000"/>
+                  </a:schemeClr>
+                </a:solidFill>
+              </a:rPr>
+              <a:t>Oculus Rift</a:t>
+            </a:r>
+            <a:endParaRPr lang="en-GB" sz="2800" dirty="0">
+              <a:solidFill>
+                <a:schemeClr val="accent6">
+                  <a:lumMod val="50000"/>
+                </a:schemeClr>
+              </a:solidFill>
+            </a:endParaRPr>
+          </a:p>
+        </p:txBody>
+      </p:sp>
+      <p:sp>
+        <p:nvSpPr>
+          <p:cNvPr id="16" name="Rectangle 15"/>
+          <p:cNvSpPr/>
+          <p:nvPr/>
+        </p:nvSpPr>
+        <p:spPr>
+          <a:xfrm>
+            <a:off x="8610600" y="1949450"/>
+            <a:ext cx="1905000" cy="869950"/>
+          </a:xfrm>
+          <a:prstGeom prst="rect">
+            <a:avLst/>
+          </a:prstGeom>
+          <a:solidFill>
+            <a:schemeClr val="accent6">
+              <a:lumMod val="60000"/>
+              <a:lumOff val="40000"/>
+            </a:schemeClr>
+          </a:solidFill>
+          <a:ln>
+            <a:solidFill>
+              <a:schemeClr val="accent6">
+                <a:lumMod val="75000"/>
+              </a:schemeClr>
+            </a:solidFill>
+          </a:ln>
+        </p:spPr>
+        <p:style>
+          <a:lnRef idx="2">
+            <a:schemeClr val="accent2">
+              <a:shade val="50000"/>
+            </a:schemeClr>
+          </a:lnRef>
+          <a:fillRef idx="1">
+            <a:schemeClr val="accent2"/>
+          </a:fillRef>
+          <a:effectRef idx="0">
+            <a:schemeClr val="accent2"/>
+          </a:effectRef>
+          <a:fontRef idx="minor">
+            <a:schemeClr val="lt1"/>
+          </a:fontRef>
+        </p:style>
+        <p:txBody>
+          <a:bodyPr rtlCol="0" anchor="ctr"/>
+          <a:lstStyle/>
+          <a:p>
+            <a:pPr algn="ctr"/>
+            <a:r>
+              <a:rPr lang="en-GB" sz="2800" smtClean="0"/>
+              <a:t>HTC Vive</a:t>
+            </a:r>
+            <a:endParaRPr lang="en-GB" sz="2800" dirty="0"/>
+          </a:p>
+        </p:txBody>
+      </p:sp>
+      <p:sp>
+        <p:nvSpPr>
+          <p:cNvPr id="17" name="Rectangle 16"/>
+          <p:cNvSpPr/>
+          <p:nvPr/>
+        </p:nvSpPr>
+        <p:spPr>
+          <a:xfrm>
+            <a:off x="8610600" y="2997200"/>
+            <a:ext cx="1905000" cy="869950"/>
+          </a:xfrm>
+          <a:prstGeom prst="rect">
+            <a:avLst/>
+          </a:prstGeom>
+          <a:solidFill>
+            <a:schemeClr val="accent6">
+              <a:lumMod val="20000"/>
+              <a:lumOff val="80000"/>
+            </a:schemeClr>
+          </a:solidFill>
+          <a:ln>
+            <a:solidFill>
+              <a:schemeClr val="accent6">
+                <a:lumMod val="75000"/>
+              </a:schemeClr>
+            </a:solidFill>
+          </a:ln>
+        </p:spPr>
+        <p:style>
+          <a:lnRef idx="2">
+            <a:schemeClr val="accent2">
+              <a:shade val="50000"/>
+            </a:schemeClr>
+          </a:lnRef>
+          <a:fillRef idx="1">
+            <a:schemeClr val="accent2"/>
+          </a:fillRef>
+          <a:effectRef idx="0">
+            <a:schemeClr val="accent2"/>
+          </a:effectRef>
+          <a:fontRef idx="minor">
+            <a:schemeClr val="lt1"/>
+          </a:fontRef>
+        </p:style>
+        <p:txBody>
+          <a:bodyPr rtlCol="0" anchor="ctr"/>
+          <a:lstStyle/>
+          <a:p>
+            <a:pPr algn="ctr"/>
+            <a:r>
+              <a:rPr lang="en-GB" sz="2800" dirty="0" smtClean="0">
+                <a:solidFill>
+                  <a:schemeClr val="accent6">
+                    <a:lumMod val="50000"/>
+                  </a:schemeClr>
+                </a:solidFill>
+              </a:rPr>
+              <a:t>Future Hardware</a:t>
+            </a:r>
+            <a:endParaRPr lang="en-GB" sz="2800" dirty="0">
+              <a:solidFill>
+                <a:schemeClr val="accent6">
+                  <a:lumMod val="50000"/>
+                </a:schemeClr>
+              </a:solidFill>
+            </a:endParaRPr>
+          </a:p>
+        </p:txBody>
+      </p:sp>
+      <p:sp>
+        <p:nvSpPr>
+          <p:cNvPr id="18" name="Right Arrow 17"/>
+          <p:cNvSpPr/>
+          <p:nvPr/>
+        </p:nvSpPr>
+        <p:spPr>
+          <a:xfrm>
+            <a:off x="3111500" y="1257300"/>
+            <a:ext cx="469900" cy="355600"/>
+          </a:xfrm>
+          <a:prstGeom prst="rightArrow">
+            <a:avLst/>
+          </a:prstGeom>
+          <a:solidFill>
+            <a:schemeClr val="accent6">
+              <a:lumMod val="60000"/>
+              <a:lumOff val="40000"/>
+            </a:schemeClr>
+          </a:solidFill>
+        </p:spPr>
+        <p:style>
+          <a:lnRef idx="2">
+            <a:schemeClr val="accent1">
+              <a:shade val="50000"/>
+            </a:schemeClr>
+          </a:lnRef>
+          <a:fillRef idx="1">
+            <a:schemeClr val="accent1"/>
+          </a:fillRef>
+          <a:effectRef idx="0">
+            <a:schemeClr val="accent1"/>
+          </a:effectRef>
+          <a:fontRef idx="minor">
+            <a:schemeClr val="lt1"/>
+          </a:fontRef>
+        </p:style>
+        <p:txBody>
+          <a:bodyPr rtlCol="0" anchor="ctr"/>
+          <a:lstStyle/>
+          <a:p>
+            <a:pPr algn="ctr"/>
+            <a:endParaRPr lang="en-GB"/>
+          </a:p>
+        </p:txBody>
+      </p:sp>
+      <p:sp>
+        <p:nvSpPr>
+          <p:cNvPr id="19" name="Right Arrow 18"/>
+          <p:cNvSpPr/>
+          <p:nvPr/>
+        </p:nvSpPr>
+        <p:spPr>
+          <a:xfrm>
+            <a:off x="5613400" y="1270000"/>
+            <a:ext cx="469900" cy="355600"/>
+          </a:xfrm>
+          <a:prstGeom prst="rightArrow">
+            <a:avLst/>
+          </a:prstGeom>
+          <a:solidFill>
+            <a:schemeClr val="accent6">
+              <a:lumMod val="60000"/>
+              <a:lumOff val="40000"/>
+            </a:schemeClr>
+          </a:solidFill>
+          <a:ln>
+            <a:solidFill>
+              <a:schemeClr val="accent6">
+                <a:lumMod val="75000"/>
+              </a:schemeClr>
+            </a:solidFill>
+          </a:ln>
+        </p:spPr>
+        <p:style>
+          <a:lnRef idx="2">
+            <a:schemeClr val="accent1">
+              <a:shade val="50000"/>
+            </a:schemeClr>
+          </a:lnRef>
+          <a:fillRef idx="1">
+            <a:schemeClr val="accent1"/>
+          </a:fillRef>
+          <a:effectRef idx="0">
+            <a:schemeClr val="accent1"/>
+          </a:effectRef>
+          <a:fontRef idx="minor">
+            <a:schemeClr val="lt1"/>
+          </a:fontRef>
+        </p:style>
+        <p:txBody>
+          <a:bodyPr rtlCol="0" anchor="ctr"/>
+          <a:lstStyle/>
+          <a:p>
+            <a:pPr algn="ctr"/>
+            <a:endParaRPr lang="en-GB"/>
+          </a:p>
+        </p:txBody>
+      </p:sp>
+      <p:sp>
+        <p:nvSpPr>
+          <p:cNvPr id="20" name="Right Arrow 19"/>
+          <p:cNvSpPr/>
+          <p:nvPr/>
+        </p:nvSpPr>
+        <p:spPr>
+          <a:xfrm>
+            <a:off x="8096250" y="2235200"/>
+            <a:ext cx="469900" cy="355600"/>
+          </a:xfrm>
+          <a:prstGeom prst="rightArrow">
+            <a:avLst/>
+          </a:prstGeom>
+          <a:solidFill>
+            <a:schemeClr val="accent6">
+              <a:lumMod val="60000"/>
+              <a:lumOff val="40000"/>
+            </a:schemeClr>
+          </a:solidFill>
+          <a:ln>
+            <a:solidFill>
+              <a:schemeClr val="accent6">
+                <a:lumMod val="75000"/>
+              </a:schemeClr>
+            </a:solidFill>
+          </a:ln>
+        </p:spPr>
+        <p:style>
+          <a:lnRef idx="2">
+            <a:schemeClr val="accent1">
+              <a:shade val="50000"/>
+            </a:schemeClr>
+          </a:lnRef>
+          <a:fillRef idx="1">
+            <a:schemeClr val="accent1"/>
+          </a:fillRef>
+          <a:effectRef idx="0">
+            <a:schemeClr val="accent1"/>
+          </a:effectRef>
+          <a:fontRef idx="minor">
+            <a:schemeClr val="lt1"/>
+          </a:fontRef>
+        </p:style>
+        <p:txBody>
+          <a:bodyPr rtlCol="0" anchor="ctr"/>
+          <a:lstStyle/>
+          <a:p>
+            <a:pPr algn="ctr"/>
+            <a:endParaRPr lang="en-GB"/>
+          </a:p>
+        </p:txBody>
+      </p:sp>
+      <p:sp>
+        <p:nvSpPr>
+          <p:cNvPr id="21" name="Right Arrow 20"/>
+          <p:cNvSpPr/>
+          <p:nvPr/>
+        </p:nvSpPr>
+        <p:spPr>
+          <a:xfrm>
+            <a:off x="3098800" y="3975100"/>
+            <a:ext cx="469900" cy="355600"/>
+          </a:xfrm>
+          <a:prstGeom prst="rightArrow">
+            <a:avLst/>
+          </a:prstGeom>
+          <a:solidFill>
+            <a:schemeClr val="accent1">
+              <a:lumMod val="40000"/>
+              <a:lumOff val="60000"/>
+            </a:schemeClr>
+          </a:solidFill>
+        </p:spPr>
+        <p:style>
+          <a:lnRef idx="2">
+            <a:schemeClr val="accent1">
+              <a:shade val="50000"/>
+            </a:schemeClr>
+          </a:lnRef>
+          <a:fillRef idx="1">
+            <a:schemeClr val="accent1"/>
+          </a:fillRef>
+          <a:effectRef idx="0">
+            <a:schemeClr val="accent1"/>
+          </a:effectRef>
+          <a:fontRef idx="minor">
+            <a:schemeClr val="lt1"/>
+          </a:fontRef>
+        </p:style>
+        <p:txBody>
+          <a:bodyPr rtlCol="0" anchor="ctr"/>
+          <a:lstStyle/>
+          <a:p>
+            <a:pPr algn="ctr"/>
+            <a:endParaRPr lang="en-GB"/>
+          </a:p>
+        </p:txBody>
+      </p:sp>
+      <p:sp>
+        <p:nvSpPr>
+          <p:cNvPr id="22" name="Right Arrow 21"/>
+          <p:cNvSpPr/>
+          <p:nvPr/>
+        </p:nvSpPr>
+        <p:spPr>
+          <a:xfrm>
+            <a:off x="5588000" y="4448175"/>
+            <a:ext cx="469900" cy="355600"/>
+          </a:xfrm>
+          <a:prstGeom prst="rightArrow">
+            <a:avLst/>
+          </a:prstGeom>
+          <a:solidFill>
+            <a:schemeClr val="bg1">
+              <a:lumMod val="85000"/>
+            </a:schemeClr>
+          </a:solidFill>
+        </p:spPr>
+        <p:style>
+          <a:lnRef idx="2">
+            <a:schemeClr val="accent1">
+              <a:shade val="50000"/>
+            </a:schemeClr>
+          </a:lnRef>
+          <a:fillRef idx="1">
+            <a:schemeClr val="accent1"/>
+          </a:fillRef>
+          <a:effectRef idx="0">
+            <a:schemeClr val="accent1"/>
+          </a:effectRef>
+          <a:fontRef idx="minor">
+            <a:schemeClr val="lt1"/>
+          </a:fontRef>
+        </p:style>
+        <p:txBody>
+          <a:bodyPr rtlCol="0" anchor="ctr"/>
+          <a:lstStyle/>
+          <a:p>
+            <a:pPr algn="ctr"/>
+            <a:endParaRPr lang="en-GB">
+              <a:solidFill>
+                <a:schemeClr val="tx1">
+                  <a:lumMod val="50000"/>
+                  <a:lumOff val="50000"/>
+                </a:schemeClr>
+              </a:solidFill>
+            </a:endParaRPr>
+          </a:p>
+        </p:txBody>
+      </p:sp>
+      <p:sp>
+        <p:nvSpPr>
+          <p:cNvPr id="23" name="Right Arrow 22"/>
+          <p:cNvSpPr/>
+          <p:nvPr/>
+        </p:nvSpPr>
+        <p:spPr>
+          <a:xfrm>
+            <a:off x="5600700" y="5457825"/>
+            <a:ext cx="469900" cy="355600"/>
+          </a:xfrm>
+          <a:prstGeom prst="rightArrow">
+            <a:avLst/>
+          </a:prstGeom>
+          <a:solidFill>
+            <a:schemeClr val="bg1">
+              <a:lumMod val="85000"/>
+            </a:schemeClr>
+          </a:solidFill>
+        </p:spPr>
+        <p:style>
+          <a:lnRef idx="2">
+            <a:schemeClr val="accent1">
+              <a:shade val="50000"/>
+            </a:schemeClr>
+          </a:lnRef>
+          <a:fillRef idx="1">
+            <a:schemeClr val="accent1"/>
+          </a:fillRef>
+          <a:effectRef idx="0">
+            <a:schemeClr val="accent1"/>
+          </a:effectRef>
+          <a:fontRef idx="minor">
+            <a:schemeClr val="lt1"/>
+          </a:fontRef>
+        </p:style>
+        <p:txBody>
+          <a:bodyPr rtlCol="0" anchor="ctr"/>
+          <a:lstStyle/>
+          <a:p>
+            <a:pPr algn="ctr"/>
+            <a:endParaRPr lang="en-GB">
+              <a:solidFill>
+                <a:schemeClr val="tx1">
+                  <a:lumMod val="50000"/>
+                  <a:lumOff val="50000"/>
+                </a:schemeClr>
+              </a:solidFill>
+            </a:endParaRPr>
+          </a:p>
+        </p:txBody>
+      </p:sp>
+      <p:sp>
+        <p:nvSpPr>
+          <p:cNvPr id="24" name="Right Arrow 23"/>
+          <p:cNvSpPr/>
+          <p:nvPr/>
+        </p:nvSpPr>
+        <p:spPr>
+          <a:xfrm>
+            <a:off x="8089900" y="4448175"/>
+            <a:ext cx="469900" cy="355600"/>
+          </a:xfrm>
+          <a:prstGeom prst="rightArrow">
+            <a:avLst/>
+          </a:prstGeom>
+          <a:solidFill>
+            <a:schemeClr val="bg1">
+              <a:lumMod val="85000"/>
+            </a:schemeClr>
+          </a:solidFill>
+        </p:spPr>
+        <p:style>
+          <a:lnRef idx="2">
+            <a:schemeClr val="accent1">
+              <a:shade val="50000"/>
+            </a:schemeClr>
+          </a:lnRef>
+          <a:fillRef idx="1">
+            <a:schemeClr val="accent1"/>
+          </a:fillRef>
+          <a:effectRef idx="0">
+            <a:schemeClr val="accent1"/>
+          </a:effectRef>
+          <a:fontRef idx="minor">
+            <a:schemeClr val="lt1"/>
+          </a:fontRef>
+        </p:style>
+        <p:txBody>
+          <a:bodyPr rtlCol="0" anchor="ctr"/>
+          <a:lstStyle/>
+          <a:p>
+            <a:pPr algn="ctr"/>
+            <a:endParaRPr lang="en-GB">
+              <a:solidFill>
+                <a:schemeClr val="tx1">
+                  <a:lumMod val="50000"/>
+                  <a:lumOff val="50000"/>
+                </a:schemeClr>
+              </a:solidFill>
+            </a:endParaRPr>
+          </a:p>
+        </p:txBody>
+      </p:sp>
+      <p:sp>
+        <p:nvSpPr>
+          <p:cNvPr id="25" name="Right Arrow 24"/>
+          <p:cNvSpPr/>
+          <p:nvPr/>
+        </p:nvSpPr>
+        <p:spPr>
+          <a:xfrm>
+            <a:off x="8089900" y="5457825"/>
+            <a:ext cx="469900" cy="355600"/>
+          </a:xfrm>
+          <a:prstGeom prst="rightArrow">
+            <a:avLst/>
+          </a:prstGeom>
+          <a:solidFill>
+            <a:schemeClr val="bg1">
+              <a:lumMod val="85000"/>
+            </a:schemeClr>
+          </a:solidFill>
+        </p:spPr>
+        <p:style>
+          <a:lnRef idx="2">
+            <a:schemeClr val="accent1">
+              <a:shade val="50000"/>
+            </a:schemeClr>
+          </a:lnRef>
+          <a:fillRef idx="1">
+            <a:schemeClr val="accent1"/>
+          </a:fillRef>
+          <a:effectRef idx="0">
+            <a:schemeClr val="accent1"/>
+          </a:effectRef>
+          <a:fontRef idx="minor">
+            <a:schemeClr val="lt1"/>
+          </a:fontRef>
+        </p:style>
+        <p:txBody>
+          <a:bodyPr rtlCol="0" anchor="ctr"/>
+          <a:lstStyle/>
+          <a:p>
+            <a:pPr algn="ctr"/>
+            <a:endParaRPr lang="en-GB">
+              <a:solidFill>
+                <a:schemeClr val="tx1">
+                  <a:lumMod val="50000"/>
+                  <a:lumOff val="50000"/>
+                </a:schemeClr>
+              </a:solidFill>
+            </a:endParaRPr>
+          </a:p>
+        </p:txBody>
+      </p:sp>
+      <p:sp>
+        <p:nvSpPr>
+          <p:cNvPr id="26" name="Right Arrow 25"/>
+          <p:cNvSpPr/>
+          <p:nvPr/>
+        </p:nvSpPr>
+        <p:spPr>
+          <a:xfrm rot="3520278">
+            <a:off x="7977177" y="2753185"/>
+            <a:ext cx="701427" cy="355600"/>
+          </a:xfrm>
+          <a:prstGeom prst="rightArrow">
+            <a:avLst/>
+          </a:prstGeom>
+          <a:solidFill>
+            <a:schemeClr val="accent6">
+              <a:lumMod val="20000"/>
+              <a:lumOff val="80000"/>
+            </a:schemeClr>
+          </a:solidFill>
+          <a:ln>
+            <a:solidFill>
+              <a:schemeClr val="accent6">
+                <a:lumMod val="75000"/>
+              </a:schemeClr>
+            </a:solidFill>
+          </a:ln>
+        </p:spPr>
+        <p:style>
+          <a:lnRef idx="2">
+            <a:schemeClr val="accent1">
+              <a:shade val="50000"/>
+            </a:schemeClr>
+          </a:lnRef>
+          <a:fillRef idx="1">
+            <a:schemeClr val="accent1"/>
+          </a:fillRef>
+          <a:effectRef idx="0">
+            <a:schemeClr val="accent1"/>
+          </a:effectRef>
+          <a:fontRef idx="minor">
+            <a:schemeClr val="lt1"/>
+          </a:fontRef>
+        </p:style>
+        <p:txBody>
+          <a:bodyPr rtlCol="0" anchor="ctr"/>
+          <a:lstStyle/>
+          <a:p>
+            <a:pPr algn="ctr"/>
+            <a:endParaRPr lang="en-GB"/>
+          </a:p>
+        </p:txBody>
+      </p:sp>
+      <p:sp>
+        <p:nvSpPr>
+          <p:cNvPr id="27" name="Right Arrow 26"/>
+          <p:cNvSpPr/>
+          <p:nvPr/>
+        </p:nvSpPr>
+        <p:spPr>
+          <a:xfrm rot="18435806">
+            <a:off x="7994206" y="1699056"/>
+            <a:ext cx="701427" cy="355600"/>
+          </a:xfrm>
+          <a:prstGeom prst="rightArrow">
+            <a:avLst/>
+          </a:prstGeom>
+          <a:solidFill>
+            <a:schemeClr val="accent6">
+              <a:lumMod val="20000"/>
+              <a:lumOff val="80000"/>
+            </a:schemeClr>
+          </a:solidFill>
+          <a:ln>
+            <a:solidFill>
+              <a:schemeClr val="accent6">
+                <a:lumMod val="75000"/>
+              </a:schemeClr>
+            </a:solidFill>
+          </a:ln>
+        </p:spPr>
+        <p:style>
+          <a:lnRef idx="2">
+            <a:schemeClr val="accent1">
+              <a:shade val="50000"/>
+            </a:schemeClr>
+          </a:lnRef>
+          <a:fillRef idx="1">
+            <a:schemeClr val="accent1"/>
+          </a:fillRef>
+          <a:effectRef idx="0">
+            <a:schemeClr val="accent1"/>
+          </a:effectRef>
+          <a:fontRef idx="minor">
+            <a:schemeClr val="lt1"/>
+          </a:fontRef>
+        </p:style>
+        <p:txBody>
+          <a:bodyPr rtlCol="0" anchor="ctr"/>
+          <a:lstStyle/>
+          <a:p>
+            <a:pPr algn="ctr"/>
+            <a:endParaRPr lang="en-GB"/>
+          </a:p>
+        </p:txBody>
+      </p:sp>
+      <p:sp>
+        <p:nvSpPr>
+          <p:cNvPr id="29" name="Right Arrow 28"/>
+          <p:cNvSpPr/>
+          <p:nvPr/>
+        </p:nvSpPr>
+        <p:spPr>
+          <a:xfrm>
+            <a:off x="5600700" y="2753185"/>
+            <a:ext cx="469900" cy="355600"/>
+          </a:xfrm>
+          <a:prstGeom prst="rightArrow">
+            <a:avLst/>
+          </a:prstGeom>
+          <a:solidFill>
+            <a:schemeClr val="accent1">
+              <a:lumMod val="40000"/>
+              <a:lumOff val="60000"/>
+            </a:schemeClr>
+          </a:solidFill>
+        </p:spPr>
+        <p:style>
+          <a:lnRef idx="2">
+            <a:schemeClr val="accent1">
+              <a:shade val="50000"/>
+            </a:schemeClr>
+          </a:lnRef>
+          <a:fillRef idx="1">
+            <a:schemeClr val="accent1"/>
+          </a:fillRef>
+          <a:effectRef idx="0">
+            <a:schemeClr val="accent1"/>
+          </a:effectRef>
+          <a:fontRef idx="minor">
+            <a:schemeClr val="lt1"/>
+          </a:fontRef>
+        </p:style>
+        <p:txBody>
+          <a:bodyPr rtlCol="0" anchor="ctr"/>
+          <a:lstStyle/>
+          <a:p>
+            <a:pPr algn="ctr"/>
+            <a:endParaRPr lang="en-GB"/>
+          </a:p>
+        </p:txBody>
+      </p:sp>
+    </p:spTree>
+    <p:extLst>
+      <p:ext uri="{BB962C8B-B14F-4D97-AF65-F5344CB8AC3E}">
+        <p14:creationId xmlns:p14="http://schemas.microsoft.com/office/powerpoint/2010/main" val="2154280363"/>
       </p:ext>
     </p:extLst>
   </p:cSld>

</xml_diff>